<commit_message>
ini udah ada tambahan di GUI
</commit_message>
<xml_diff>
--- a/Bukunya/flowchart_TA.pptx
+++ b/Bukunya/flowchart_TA.pptx
@@ -14984,13 +14984,13 @@
             <p:ph idx="1"/>
             <p:extLst>
               <p:ext uri="{D42A27DB-BD31-4B8C-83A1-F6EECF244321}">
-                <p14:modId xmlns:p14="http://schemas.microsoft.com/office/powerpoint/2010/main" val="1004665072"/>
+                <p14:modId xmlns:p14="http://schemas.microsoft.com/office/powerpoint/2010/main" val="199453944"/>
               </p:ext>
             </p:extLst>
           </p:nvPr>
         </p:nvGraphicFramePr>
         <p:xfrm>
-          <a:off x="710184" y="-83248"/>
+          <a:off x="509016" y="-1089088"/>
           <a:ext cx="10515600" cy="9265920"/>
         </p:xfrm>
         <a:graphic>
@@ -17030,25 +17030,579 @@
           </a:p>
         </p:txBody>
       </p:sp>
-      <p:sp>
-        <p:nvSpPr>
-          <p:cNvPr id="3" name="Content Placeholder 2"/>
-          <p:cNvSpPr>
-            <a:spLocks noGrp="1"/>
-          </p:cNvSpPr>
+      <p:graphicFrame>
+        <p:nvGraphicFramePr>
+          <p:cNvPr id="4" name="Content Placeholder 3"/>
+          <p:cNvGraphicFramePr>
+            <a:graphicFrameLocks noGrp="1"/>
+          </p:cNvGraphicFramePr>
           <p:nvPr>
             <p:ph idx="1"/>
+            <p:extLst>
+              <p:ext uri="{D42A27DB-BD31-4B8C-83A1-F6EECF244321}">
+                <p14:modId xmlns:p14="http://schemas.microsoft.com/office/powerpoint/2010/main" val="2087139473"/>
+              </p:ext>
+            </p:extLst>
           </p:nvPr>
-        </p:nvSpPr>
-        <p:spPr/>
-        <p:txBody>
-          <a:bodyPr/>
-          <a:lstStyle/>
-          <a:p>
-            <a:endParaRPr lang="en-US"/>
-          </a:p>
-        </p:txBody>
-      </p:sp>
+        </p:nvGraphicFramePr>
+        <p:xfrm>
+          <a:off x="838200" y="1825625"/>
+          <a:ext cx="8412480" cy="4414520"/>
+        </p:xfrm>
+        <a:graphic>
+          <a:graphicData uri="http://schemas.openxmlformats.org/drawingml/2006/table">
+            <a:tbl>
+              <a:tblPr firstRow="1" bandRow="1">
+                <a:tableStyleId>{5C22544A-7EE6-4342-B048-85BDC9FD1C3A}</a:tableStyleId>
+              </a:tblPr>
+              <a:tblGrid>
+                <a:gridCol w="2103120"/>
+                <a:gridCol w="2103120"/>
+                <a:gridCol w="2103120"/>
+                <a:gridCol w="2103120"/>
+              </a:tblGrid>
+              <a:tr h="370840">
+                <a:tc>
+                  <a:txBody>
+                    <a:bodyPr/>
+                    <a:lstStyle/>
+                    <a:p>
+                      <a:r>
+                        <a:rPr lang="en-US" dirty="0" err="1" smtClean="0"/>
+                        <a:t>Fitur</a:t>
+                      </a:r>
+                      <a:endParaRPr lang="en-US" dirty="0"/>
+                    </a:p>
+                  </a:txBody>
+                  <a:tcPr/>
+                </a:tc>
+                <a:tc>
+                  <a:txBody>
+                    <a:bodyPr/>
+                    <a:lstStyle/>
+                    <a:p>
+                      <a:r>
+                        <a:rPr lang="en-US" dirty="0" err="1" smtClean="0"/>
+                        <a:t>Jmlh</a:t>
+                      </a:r>
+                      <a:r>
+                        <a:rPr lang="en-US" dirty="0" smtClean="0"/>
+                        <a:t> </a:t>
+                      </a:r>
+                      <a:r>
+                        <a:rPr lang="en-US" dirty="0" err="1" smtClean="0"/>
+                        <a:t>kategori</a:t>
+                      </a:r>
+                      <a:r>
+                        <a:rPr lang="en-US" dirty="0" smtClean="0"/>
+                        <a:t> </a:t>
+                      </a:r>
+                      <a:endParaRPr lang="en-US" dirty="0"/>
+                    </a:p>
+                  </a:txBody>
+                  <a:tcPr/>
+                </a:tc>
+                <a:tc>
+                  <a:txBody>
+                    <a:bodyPr/>
+                    <a:lstStyle/>
+                    <a:p>
+                      <a:r>
+                        <a:rPr lang="en-US" dirty="0" err="1" smtClean="0"/>
+                        <a:t>Jumlah</a:t>
+                      </a:r>
+                      <a:r>
+                        <a:rPr lang="en-US" dirty="0" smtClean="0"/>
+                        <a:t> image</a:t>
+                      </a:r>
+                      <a:r>
+                        <a:rPr lang="en-US" baseline="0" dirty="0" smtClean="0"/>
+                        <a:t> yang </a:t>
+                      </a:r>
+                      <a:r>
+                        <a:rPr lang="en-US" baseline="0" dirty="0" err="1" smtClean="0"/>
+                        <a:t>ditampilkan</a:t>
+                      </a:r>
+                      <a:endParaRPr lang="en-US" dirty="0"/>
+                    </a:p>
+                  </a:txBody>
+                  <a:tcPr/>
+                </a:tc>
+                <a:tc>
+                  <a:txBody>
+                    <a:bodyPr/>
+                    <a:lstStyle/>
+                    <a:p>
+                      <a:r>
+                        <a:rPr lang="en-US" dirty="0" smtClean="0"/>
+                        <a:t>Rata-rata precision</a:t>
+                      </a:r>
+                      <a:endParaRPr lang="en-US" dirty="0"/>
+                    </a:p>
+                  </a:txBody>
+                  <a:tcPr/>
+                </a:tc>
+              </a:tr>
+              <a:tr h="370840">
+                <a:tc>
+                  <a:txBody>
+                    <a:bodyPr/>
+                    <a:lstStyle/>
+                    <a:p>
+                      <a:r>
+                        <a:rPr lang="en-US" dirty="0" smtClean="0"/>
+                        <a:t>Color histogram</a:t>
+                      </a:r>
+                      <a:endParaRPr lang="en-US" dirty="0"/>
+                    </a:p>
+                  </a:txBody>
+                  <a:tcPr/>
+                </a:tc>
+                <a:tc>
+                  <a:txBody>
+                    <a:bodyPr/>
+                    <a:lstStyle/>
+                    <a:p>
+                      <a:r>
+                        <a:rPr lang="en-US" dirty="0" smtClean="0"/>
+                        <a:t>100</a:t>
+                      </a:r>
+                      <a:endParaRPr lang="en-US" dirty="0"/>
+                    </a:p>
+                  </a:txBody>
+                  <a:tcPr/>
+                </a:tc>
+                <a:tc>
+                  <a:txBody>
+                    <a:bodyPr/>
+                    <a:lstStyle/>
+                    <a:p>
+                      <a:r>
+                        <a:rPr lang="en-US" dirty="0" smtClean="0"/>
+                        <a:t>12</a:t>
+                      </a:r>
+                      <a:endParaRPr lang="en-US" dirty="0"/>
+                    </a:p>
+                  </a:txBody>
+                  <a:tcPr/>
+                </a:tc>
+                <a:tc>
+                  <a:txBody>
+                    <a:bodyPr/>
+                    <a:lstStyle/>
+                    <a:p>
+                      <a:r>
+                        <a:rPr lang="en-US" dirty="0" smtClean="0"/>
+                        <a:t>30.98 %</a:t>
+                      </a:r>
+                      <a:endParaRPr lang="en-US" dirty="0"/>
+                    </a:p>
+                  </a:txBody>
+                  <a:tcPr/>
+                </a:tc>
+              </a:tr>
+              <a:tr h="370840">
+                <a:tc>
+                  <a:txBody>
+                    <a:bodyPr/>
+                    <a:lstStyle/>
+                    <a:p>
+                      <a:r>
+                        <a:rPr lang="en-US" dirty="0" smtClean="0"/>
+                        <a:t>BDIP</a:t>
+                      </a:r>
+                      <a:endParaRPr lang="en-US" dirty="0"/>
+                    </a:p>
+                  </a:txBody>
+                  <a:tcPr/>
+                </a:tc>
+                <a:tc>
+                  <a:txBody>
+                    <a:bodyPr/>
+                    <a:lstStyle/>
+                    <a:p>
+                      <a:r>
+                        <a:rPr lang="en-US" dirty="0" smtClean="0"/>
+                        <a:t>100</a:t>
+                      </a:r>
+                      <a:endParaRPr lang="en-US" dirty="0"/>
+                    </a:p>
+                  </a:txBody>
+                  <a:tcPr/>
+                </a:tc>
+                <a:tc>
+                  <a:txBody>
+                    <a:bodyPr/>
+                    <a:lstStyle/>
+                    <a:p>
+                      <a:r>
+                        <a:rPr lang="en-US" dirty="0" smtClean="0"/>
+                        <a:t>12</a:t>
+                      </a:r>
+                      <a:endParaRPr lang="en-US" dirty="0"/>
+                    </a:p>
+                  </a:txBody>
+                  <a:tcPr/>
+                </a:tc>
+                <a:tc>
+                  <a:txBody>
+                    <a:bodyPr/>
+                    <a:lstStyle/>
+                    <a:p>
+                      <a:r>
+                        <a:rPr lang="en-US" dirty="0" smtClean="0"/>
+                        <a:t>10.56 %</a:t>
+                      </a:r>
+                      <a:endParaRPr lang="en-US" dirty="0"/>
+                    </a:p>
+                  </a:txBody>
+                  <a:tcPr/>
+                </a:tc>
+              </a:tr>
+              <a:tr h="370840">
+                <a:tc>
+                  <a:txBody>
+                    <a:bodyPr/>
+                    <a:lstStyle/>
+                    <a:p>
+                      <a:r>
+                        <a:rPr lang="en-US" dirty="0" smtClean="0"/>
+                        <a:t>BVLC</a:t>
+                      </a:r>
+                      <a:endParaRPr lang="en-US" dirty="0"/>
+                    </a:p>
+                  </a:txBody>
+                  <a:tcPr/>
+                </a:tc>
+                <a:tc>
+                  <a:txBody>
+                    <a:bodyPr/>
+                    <a:lstStyle/>
+                    <a:p>
+                      <a:r>
+                        <a:rPr lang="en-US" dirty="0" smtClean="0"/>
+                        <a:t>100</a:t>
+                      </a:r>
+                      <a:endParaRPr lang="en-US" dirty="0"/>
+                    </a:p>
+                  </a:txBody>
+                  <a:tcPr/>
+                </a:tc>
+                <a:tc>
+                  <a:txBody>
+                    <a:bodyPr/>
+                    <a:lstStyle/>
+                    <a:p>
+                      <a:r>
+                        <a:rPr lang="en-US" dirty="0" smtClean="0"/>
+                        <a:t>12</a:t>
+                      </a:r>
+                      <a:endParaRPr lang="en-US" dirty="0"/>
+                    </a:p>
+                  </a:txBody>
+                  <a:tcPr/>
+                </a:tc>
+                <a:tc>
+                  <a:txBody>
+                    <a:bodyPr/>
+                    <a:lstStyle/>
+                    <a:p>
+                      <a:r>
+                        <a:rPr lang="en-US" dirty="0" smtClean="0"/>
+                        <a:t>10.65 %</a:t>
+                      </a:r>
+                      <a:endParaRPr lang="en-US" dirty="0"/>
+                    </a:p>
+                  </a:txBody>
+                  <a:tcPr/>
+                </a:tc>
+              </a:tr>
+              <a:tr h="370840">
+                <a:tc>
+                  <a:txBody>
+                    <a:bodyPr/>
+                    <a:lstStyle/>
+                    <a:p>
+                      <a:r>
+                        <a:rPr lang="en-US" dirty="0" smtClean="0"/>
+                        <a:t>BDIP + BVLC</a:t>
+                      </a:r>
+                      <a:endParaRPr lang="en-US" dirty="0"/>
+                    </a:p>
+                  </a:txBody>
+                  <a:tcPr/>
+                </a:tc>
+                <a:tc>
+                  <a:txBody>
+                    <a:bodyPr/>
+                    <a:lstStyle/>
+                    <a:p>
+                      <a:r>
+                        <a:rPr lang="en-US" dirty="0" smtClean="0"/>
+                        <a:t>100</a:t>
+                      </a:r>
+                      <a:endParaRPr lang="en-US" dirty="0"/>
+                    </a:p>
+                  </a:txBody>
+                  <a:tcPr/>
+                </a:tc>
+                <a:tc>
+                  <a:txBody>
+                    <a:bodyPr/>
+                    <a:lstStyle/>
+                    <a:p>
+                      <a:r>
+                        <a:rPr lang="en-US" dirty="0" smtClean="0"/>
+                        <a:t>12</a:t>
+                      </a:r>
+                      <a:endParaRPr lang="en-US" dirty="0"/>
+                    </a:p>
+                  </a:txBody>
+                  <a:tcPr/>
+                </a:tc>
+                <a:tc>
+                  <a:txBody>
+                    <a:bodyPr/>
+                    <a:lstStyle/>
+                    <a:p>
+                      <a:r>
+                        <a:rPr lang="en-US" dirty="0" smtClean="0"/>
+                        <a:t>14.5 %</a:t>
+                      </a:r>
+                      <a:endParaRPr lang="en-US" dirty="0"/>
+                    </a:p>
+                  </a:txBody>
+                  <a:tcPr/>
+                </a:tc>
+              </a:tr>
+              <a:tr h="370840">
+                <a:tc>
+                  <a:txBody>
+                    <a:bodyPr/>
+                    <a:lstStyle/>
+                    <a:p>
+                      <a:r>
+                        <a:rPr lang="en-US" dirty="0" smtClean="0"/>
+                        <a:t>Color histogram + BDIP</a:t>
+                      </a:r>
+                      <a:endParaRPr lang="en-US" dirty="0"/>
+                    </a:p>
+                  </a:txBody>
+                  <a:tcPr/>
+                </a:tc>
+                <a:tc>
+                  <a:txBody>
+                    <a:bodyPr/>
+                    <a:lstStyle/>
+                    <a:p>
+                      <a:r>
+                        <a:rPr lang="en-US" dirty="0" smtClean="0"/>
+                        <a:t>100</a:t>
+                      </a:r>
+                      <a:endParaRPr lang="en-US" dirty="0"/>
+                    </a:p>
+                  </a:txBody>
+                  <a:tcPr/>
+                </a:tc>
+                <a:tc>
+                  <a:txBody>
+                    <a:bodyPr/>
+                    <a:lstStyle/>
+                    <a:p>
+                      <a:r>
+                        <a:rPr lang="en-US" dirty="0" smtClean="0"/>
+                        <a:t>12</a:t>
+                      </a:r>
+                      <a:endParaRPr lang="en-US" dirty="0"/>
+                    </a:p>
+                  </a:txBody>
+                  <a:tcPr/>
+                </a:tc>
+                <a:tc>
+                  <a:txBody>
+                    <a:bodyPr/>
+                    <a:lstStyle/>
+                    <a:p>
+                      <a:r>
+                        <a:rPr lang="en-US" dirty="0" smtClean="0"/>
+                        <a:t>31 %</a:t>
+                      </a:r>
+                      <a:endParaRPr lang="en-US" dirty="0"/>
+                    </a:p>
+                  </a:txBody>
+                  <a:tcPr/>
+                </a:tc>
+              </a:tr>
+              <a:tr h="370840">
+                <a:tc>
+                  <a:txBody>
+                    <a:bodyPr/>
+                    <a:lstStyle/>
+                    <a:p>
+                      <a:r>
+                        <a:rPr lang="en-US" dirty="0" smtClean="0"/>
+                        <a:t>Color</a:t>
+                      </a:r>
+                      <a:r>
+                        <a:rPr lang="en-US" baseline="0" dirty="0" smtClean="0"/>
+                        <a:t> histogram + BVLC</a:t>
+                      </a:r>
+                      <a:endParaRPr lang="en-US" dirty="0"/>
+                    </a:p>
+                  </a:txBody>
+                  <a:tcPr/>
+                </a:tc>
+                <a:tc>
+                  <a:txBody>
+                    <a:bodyPr/>
+                    <a:lstStyle/>
+                    <a:p>
+                      <a:r>
+                        <a:rPr lang="en-US" dirty="0" smtClean="0"/>
+                        <a:t>100</a:t>
+                      </a:r>
+                      <a:endParaRPr lang="en-US" dirty="0"/>
+                    </a:p>
+                  </a:txBody>
+                  <a:tcPr/>
+                </a:tc>
+                <a:tc>
+                  <a:txBody>
+                    <a:bodyPr/>
+                    <a:lstStyle/>
+                    <a:p>
+                      <a:r>
+                        <a:rPr lang="en-US" dirty="0" smtClean="0"/>
+                        <a:t>12</a:t>
+                      </a:r>
+                      <a:endParaRPr lang="en-US" dirty="0"/>
+                    </a:p>
+                  </a:txBody>
+                  <a:tcPr/>
+                </a:tc>
+                <a:tc>
+                  <a:txBody>
+                    <a:bodyPr/>
+                    <a:lstStyle/>
+                    <a:p>
+                      <a:r>
+                        <a:rPr lang="en-US" smtClean="0"/>
+                        <a:t>31 %</a:t>
+                      </a:r>
+                      <a:endParaRPr lang="en-US" dirty="0"/>
+                    </a:p>
+                  </a:txBody>
+                  <a:tcPr/>
+                </a:tc>
+              </a:tr>
+              <a:tr h="370840">
+                <a:tc>
+                  <a:txBody>
+                    <a:bodyPr/>
+                    <a:lstStyle/>
+                    <a:p>
+                      <a:r>
+                        <a:rPr lang="en-US" dirty="0" smtClean="0"/>
+                        <a:t>Color</a:t>
+                      </a:r>
+                      <a:r>
+                        <a:rPr lang="en-US" baseline="0" dirty="0" smtClean="0"/>
+                        <a:t> histogram + BDIP + BVLC</a:t>
+                      </a:r>
+                      <a:endParaRPr lang="en-US" dirty="0"/>
+                    </a:p>
+                  </a:txBody>
+                  <a:tcPr/>
+                </a:tc>
+                <a:tc>
+                  <a:txBody>
+                    <a:bodyPr/>
+                    <a:lstStyle/>
+                    <a:p>
+                      <a:r>
+                        <a:rPr lang="en-US" dirty="0" smtClean="0"/>
+                        <a:t>100</a:t>
+                      </a:r>
+                      <a:endParaRPr lang="en-US" dirty="0"/>
+                    </a:p>
+                  </a:txBody>
+                  <a:tcPr/>
+                </a:tc>
+                <a:tc>
+                  <a:txBody>
+                    <a:bodyPr/>
+                    <a:lstStyle/>
+                    <a:p>
+                      <a:r>
+                        <a:rPr lang="en-US" dirty="0" smtClean="0"/>
+                        <a:t>12</a:t>
+                      </a:r>
+                      <a:endParaRPr lang="en-US" dirty="0"/>
+                    </a:p>
+                  </a:txBody>
+                  <a:tcPr/>
+                </a:tc>
+                <a:tc>
+                  <a:txBody>
+                    <a:bodyPr/>
+                    <a:lstStyle/>
+                    <a:p>
+                      <a:r>
+                        <a:rPr lang="en-US" dirty="0" smtClean="0"/>
+                        <a:t>31%</a:t>
+                      </a:r>
+                      <a:endParaRPr lang="en-US" dirty="0"/>
+                    </a:p>
+                  </a:txBody>
+                  <a:tcPr/>
+                </a:tc>
+              </a:tr>
+              <a:tr h="370840">
+                <a:tc>
+                  <a:txBody>
+                    <a:bodyPr/>
+                    <a:lstStyle/>
+                    <a:p>
+                      <a:endParaRPr lang="en-US" dirty="0"/>
+                    </a:p>
+                  </a:txBody>
+                  <a:tcPr/>
+                </a:tc>
+                <a:tc>
+                  <a:txBody>
+                    <a:bodyPr/>
+                    <a:lstStyle/>
+                    <a:p>
+                      <a:endParaRPr lang="en-US"/>
+                    </a:p>
+                  </a:txBody>
+                  <a:tcPr/>
+                </a:tc>
+                <a:tc>
+                  <a:txBody>
+                    <a:bodyPr/>
+                    <a:lstStyle/>
+                    <a:p>
+                      <a:endParaRPr lang="en-US"/>
+                    </a:p>
+                  </a:txBody>
+                  <a:tcPr/>
+                </a:tc>
+                <a:tc>
+                  <a:txBody>
+                    <a:bodyPr/>
+                    <a:lstStyle/>
+                    <a:p>
+                      <a:endParaRPr lang="en-US" dirty="0"/>
+                    </a:p>
+                  </a:txBody>
+                  <a:tcPr/>
+                </a:tc>
+              </a:tr>
+            </a:tbl>
+          </a:graphicData>
+        </a:graphic>
+      </p:graphicFrame>
     </p:spTree>
     <p:extLst>
       <p:ext uri="{BB962C8B-B14F-4D97-AF65-F5344CB8AC3E}">

</xml_diff>